<commit_message>
Adding bookmarks into the list 'Vek'
</commit_message>
<xml_diff>
--- a/Presentation2(1).pptx
+++ b/Presentation2(1).pptx
@@ -242,7 +242,7 @@
           <a:p>
             <a:fld id="{8EAAC63E-37C1-4780-8BF5-7973FBD2F421}" type="datetimeFigureOut">
               <a:rPr lang="en-US" smtClean="0"/>
-              <a:t>12/21/2024</a:t>
+              <a:t>12/27/2024</a:t>
             </a:fld>
             <a:endParaRPr lang="en-US"/>
           </a:p>
@@ -410,7 +410,7 @@
           <a:p>
             <a:fld id="{8EAAC63E-37C1-4780-8BF5-7973FBD2F421}" type="datetimeFigureOut">
               <a:rPr lang="en-US" smtClean="0"/>
-              <a:t>12/21/2024</a:t>
+              <a:t>12/27/2024</a:t>
             </a:fld>
             <a:endParaRPr lang="en-US"/>
           </a:p>
@@ -588,7 +588,7 @@
           <a:p>
             <a:fld id="{8EAAC63E-37C1-4780-8BF5-7973FBD2F421}" type="datetimeFigureOut">
               <a:rPr lang="en-US" smtClean="0"/>
-              <a:t>12/21/2024</a:t>
+              <a:t>12/27/2024</a:t>
             </a:fld>
             <a:endParaRPr lang="en-US"/>
           </a:p>
@@ -756,7 +756,7 @@
           <a:p>
             <a:fld id="{8EAAC63E-37C1-4780-8BF5-7973FBD2F421}" type="datetimeFigureOut">
               <a:rPr lang="en-US" smtClean="0"/>
-              <a:t>12/21/2024</a:t>
+              <a:t>12/27/2024</a:t>
             </a:fld>
             <a:endParaRPr lang="en-US"/>
           </a:p>
@@ -1001,7 +1001,7 @@
           <a:p>
             <a:fld id="{8EAAC63E-37C1-4780-8BF5-7973FBD2F421}" type="datetimeFigureOut">
               <a:rPr lang="en-US" smtClean="0"/>
-              <a:t>12/21/2024</a:t>
+              <a:t>12/27/2024</a:t>
             </a:fld>
             <a:endParaRPr lang="en-US"/>
           </a:p>
@@ -1230,7 +1230,7 @@
           <a:p>
             <a:fld id="{8EAAC63E-37C1-4780-8BF5-7973FBD2F421}" type="datetimeFigureOut">
               <a:rPr lang="en-US" smtClean="0"/>
-              <a:t>12/21/2024</a:t>
+              <a:t>12/27/2024</a:t>
             </a:fld>
             <a:endParaRPr lang="en-US"/>
           </a:p>
@@ -1594,7 +1594,7 @@
           <a:p>
             <a:fld id="{8EAAC63E-37C1-4780-8BF5-7973FBD2F421}" type="datetimeFigureOut">
               <a:rPr lang="en-US" smtClean="0"/>
-              <a:t>12/21/2024</a:t>
+              <a:t>12/27/2024</a:t>
             </a:fld>
             <a:endParaRPr lang="en-US"/>
           </a:p>
@@ -1711,7 +1711,7 @@
           <a:p>
             <a:fld id="{8EAAC63E-37C1-4780-8BF5-7973FBD2F421}" type="datetimeFigureOut">
               <a:rPr lang="en-US" smtClean="0"/>
-              <a:t>12/21/2024</a:t>
+              <a:t>12/27/2024</a:t>
             </a:fld>
             <a:endParaRPr lang="en-US"/>
           </a:p>
@@ -1806,7 +1806,7 @@
           <a:p>
             <a:fld id="{8EAAC63E-37C1-4780-8BF5-7973FBD2F421}" type="datetimeFigureOut">
               <a:rPr lang="en-US" smtClean="0"/>
-              <a:t>12/21/2024</a:t>
+              <a:t>12/27/2024</a:t>
             </a:fld>
             <a:endParaRPr lang="en-US"/>
           </a:p>
@@ -2081,7 +2081,7 @@
           <a:p>
             <a:fld id="{8EAAC63E-37C1-4780-8BF5-7973FBD2F421}" type="datetimeFigureOut">
               <a:rPr lang="en-US" smtClean="0"/>
-              <a:t>12/21/2024</a:t>
+              <a:t>12/27/2024</a:t>
             </a:fld>
             <a:endParaRPr lang="en-US"/>
           </a:p>
@@ -2336,7 +2336,7 @@
           <a:p>
             <a:fld id="{8EAAC63E-37C1-4780-8BF5-7973FBD2F421}" type="datetimeFigureOut">
               <a:rPr lang="en-US" smtClean="0"/>
-              <a:t>12/21/2024</a:t>
+              <a:t>12/27/2024</a:t>
             </a:fld>
             <a:endParaRPr lang="en-US"/>
           </a:p>
@@ -2550,7 +2550,7 @@
           <a:p>
             <a:fld id="{8EAAC63E-37C1-4780-8BF5-7973FBD2F421}" type="datetimeFigureOut">
               <a:rPr lang="en-US" smtClean="0"/>
-              <a:t>12/21/2024</a:t>
+              <a:t>12/27/2024</a:t>
             </a:fld>
             <a:endParaRPr lang="en-US"/>
           </a:p>
@@ -3667,8 +3667,8 @@
         </p:nvSpPr>
         <p:spPr>
           <a:xfrm>
-            <a:off x="1251359" y="4098446"/>
-            <a:ext cx="1944000" cy="604985"/>
+            <a:off x="1272209" y="4132069"/>
+            <a:ext cx="1650461" cy="604985"/>
           </a:xfrm>
           <a:prstGeom prst="roundRect">
             <a:avLst/>
@@ -3716,10 +3716,10 @@
       </p:sp>
       <p:sp>
         <p:nvSpPr>
-          <p:cNvPr id="8" name="Obdélník: se zakulacenými rohy 7">
+          <p:cNvPr id="4" name="Obdélník: se zakulacenými rohy 3">
             <a:extLst>
               <a:ext uri="{FF2B5EF4-FFF2-40B4-BE49-F238E27FC236}">
-                <a16:creationId xmlns:a16="http://schemas.microsoft.com/office/drawing/2014/main" id="{2927EDAF-7ABB-5AB6-2C2C-696233E8A157}"/>
+                <a16:creationId xmlns:a16="http://schemas.microsoft.com/office/drawing/2014/main" id="{58BDEE34-5615-BF01-6E8E-F9CB3A22F180}"/>
               </a:ext>
             </a:extLst>
           </p:cNvPr>
@@ -3728,8 +3728,8 @@
         </p:nvSpPr>
         <p:spPr>
           <a:xfrm>
-            <a:off x="3427883" y="4098447"/>
-            <a:ext cx="1944000" cy="604985"/>
+            <a:off x="3057896" y="4141024"/>
+            <a:ext cx="1650461" cy="604985"/>
           </a:xfrm>
           <a:prstGeom prst="roundRect">
             <a:avLst/>
@@ -3777,10 +3777,10 @@
       </p:sp>
       <p:sp>
         <p:nvSpPr>
-          <p:cNvPr id="9" name="Obdélník: se zakulacenými rohy 8">
+          <p:cNvPr id="5" name="Obdélník: se zakulacenými rohy 4">
             <a:extLst>
               <a:ext uri="{FF2B5EF4-FFF2-40B4-BE49-F238E27FC236}">
-                <a16:creationId xmlns:a16="http://schemas.microsoft.com/office/drawing/2014/main" id="{34CC9202-0EE1-DD65-FD11-0CEB1FF017B8}"/>
+                <a16:creationId xmlns:a16="http://schemas.microsoft.com/office/drawing/2014/main" id="{665D39E1-04BB-E6ED-2B64-C6894F532365}"/>
               </a:ext>
             </a:extLst>
           </p:cNvPr>
@@ -3789,8 +3789,8 @@
         </p:nvSpPr>
         <p:spPr>
           <a:xfrm>
-            <a:off x="5596288" y="4098447"/>
-            <a:ext cx="1944000" cy="604985"/>
+            <a:off x="4843583" y="4132069"/>
+            <a:ext cx="1650461" cy="604985"/>
           </a:xfrm>
           <a:prstGeom prst="roundRect">
             <a:avLst/>
@@ -3838,10 +3838,10 @@
       </p:sp>
       <p:sp>
         <p:nvSpPr>
-          <p:cNvPr id="10" name="Obdélník: se zakulacenými rohy 9">
+          <p:cNvPr id="6" name="Obdélník: se zakulacenými rohy 5">
             <a:extLst>
               <a:ext uri="{FF2B5EF4-FFF2-40B4-BE49-F238E27FC236}">
-                <a16:creationId xmlns:a16="http://schemas.microsoft.com/office/drawing/2014/main" id="{F5B43FB4-063C-00A5-D3F5-2B180334DC0D}"/>
+                <a16:creationId xmlns:a16="http://schemas.microsoft.com/office/drawing/2014/main" id="{D4D786A2-49A3-D2F0-4B21-041BA417CBC2}"/>
               </a:ext>
             </a:extLst>
           </p:cNvPr>
@@ -3850,8 +3850,8 @@
         </p:nvSpPr>
         <p:spPr>
           <a:xfrm>
-            <a:off x="7764693" y="4098447"/>
-            <a:ext cx="1944000" cy="604985"/>
+            <a:off x="6629270" y="4132068"/>
+            <a:ext cx="1650461" cy="604985"/>
           </a:xfrm>
           <a:prstGeom prst="roundRect">
             <a:avLst/>
@@ -3899,10 +3899,10 @@
       </p:sp>
       <p:sp>
         <p:nvSpPr>
-          <p:cNvPr id="12" name="Obdélník: se zakulacenými rohy 11">
+          <p:cNvPr id="7" name="Obdélník: se zakulacenými rohy 6">
             <a:extLst>
               <a:ext uri="{FF2B5EF4-FFF2-40B4-BE49-F238E27FC236}">
-                <a16:creationId xmlns:a16="http://schemas.microsoft.com/office/drawing/2014/main" id="{FA29AD64-A575-295F-1BFF-97639FB48BFB}"/>
+                <a16:creationId xmlns:a16="http://schemas.microsoft.com/office/drawing/2014/main" id="{FD6EE034-EADF-0085-2C92-D33FCBA4228F}"/>
               </a:ext>
             </a:extLst>
           </p:cNvPr>
@@ -3911,8 +3911,69 @@
         </p:nvSpPr>
         <p:spPr>
           <a:xfrm>
-            <a:off x="9933098" y="4098446"/>
-            <a:ext cx="1944000" cy="604985"/>
+            <a:off x="8414957" y="4127245"/>
+            <a:ext cx="1650461" cy="604985"/>
+          </a:xfrm>
+          <a:prstGeom prst="roundRect">
+            <a:avLst/>
+          </a:prstGeom>
+          <a:solidFill>
+            <a:schemeClr val="bg1"/>
+          </a:solidFill>
+          <a:ln>
+            <a:noFill/>
+          </a:ln>
+          <a:effectLst>
+            <a:outerShdw blurRad="469900" dist="228600" dir="2700000" algn="tl" rotWithShape="0">
+              <a:schemeClr val="accent6">
+                <a:lumMod val="40000"/>
+                <a:lumOff val="60000"/>
+                <a:alpha val="40000"/>
+              </a:schemeClr>
+            </a:outerShdw>
+          </a:effectLst>
+        </p:spPr>
+        <p:style>
+          <a:lnRef idx="2">
+            <a:schemeClr val="accent1">
+              <a:shade val="15000"/>
+            </a:schemeClr>
+          </a:lnRef>
+          <a:fillRef idx="1">
+            <a:schemeClr val="accent1"/>
+          </a:fillRef>
+          <a:effectRef idx="0">
+            <a:schemeClr val="accent1"/>
+          </a:effectRef>
+          <a:fontRef idx="minor">
+            <a:schemeClr val="lt1"/>
+          </a:fontRef>
+        </p:style>
+        <p:txBody>
+          <a:bodyPr rtlCol="0" anchor="ctr"/>
+          <a:lstStyle/>
+          <a:p>
+            <a:pPr algn="ctr"/>
+            <a:endParaRPr lang="cs-CZ"/>
+          </a:p>
+        </p:txBody>
+      </p:sp>
+      <p:sp>
+        <p:nvSpPr>
+          <p:cNvPr id="13" name="Obdélník: se zakulacenými rohy 12">
+            <a:extLst>
+              <a:ext uri="{FF2B5EF4-FFF2-40B4-BE49-F238E27FC236}">
+                <a16:creationId xmlns:a16="http://schemas.microsoft.com/office/drawing/2014/main" id="{06450FBF-EC0C-6AA4-C7A8-33B4C06352A3}"/>
+              </a:ext>
+            </a:extLst>
+          </p:cNvPr>
+          <p:cNvSpPr/>
+          <p:nvPr/>
+        </p:nvSpPr>
+        <p:spPr>
+          <a:xfrm>
+            <a:off x="10200644" y="4121996"/>
+            <a:ext cx="1650461" cy="604985"/>
           </a:xfrm>
           <a:prstGeom prst="roundRect">
             <a:avLst/>

</xml_diff>